<commit_message>
chapter 8 revise finished
</commit_message>
<xml_diff>
--- a/OCP17/old progress/Chapter 8 - Lambdas and Functional Interface.pptx
+++ b/OCP17/old progress/Chapter 8 - Lambdas and Functional Interface.pptx
@@ -1025,7 +1025,7 @@
           </a:lstStyle>
           <a:p>
             <a:fld id="{9ACA2D73-2532-A640-A667-27AB4D0D333F}" type="datetimeFigureOut">
-              <a:t>14/8/25</a:t>
+              <a:t>29/11/25</a:t>
             </a:fld>
             <a:endParaRPr lang="en-VN"/>
           </a:p>
@@ -4090,7 +4090,7 @@
           <a:p>
             <a:fld id="{BAA8DE05-51EE-4692-B197-877FA1DAAAED}" type="datetimeFigureOut">
               <a:rPr lang="en-US" smtClean="0"/>
-              <a:t>8/14/25</a:t>
+              <a:t>11/29/25</a:t>
             </a:fld>
             <a:endParaRPr lang="en-US"/>
           </a:p>
@@ -4288,7 +4288,7 @@
           <a:p>
             <a:fld id="{BAA8DE05-51EE-4692-B197-877FA1DAAAED}" type="datetimeFigureOut">
               <a:rPr lang="en-US" smtClean="0"/>
-              <a:t>8/14/25</a:t>
+              <a:t>11/29/25</a:t>
             </a:fld>
             <a:endParaRPr lang="en-US"/>
           </a:p>
@@ -4496,7 +4496,7 @@
           <a:p>
             <a:fld id="{BAA8DE05-51EE-4692-B197-877FA1DAAAED}" type="datetimeFigureOut">
               <a:rPr lang="en-US" smtClean="0"/>
-              <a:t>8/14/25</a:t>
+              <a:t>11/29/25</a:t>
             </a:fld>
             <a:endParaRPr lang="en-US"/>
           </a:p>
@@ -4694,7 +4694,7 @@
           <a:p>
             <a:fld id="{BAA8DE05-51EE-4692-B197-877FA1DAAAED}" type="datetimeFigureOut">
               <a:rPr lang="en-US" smtClean="0"/>
-              <a:t>8/14/25</a:t>
+              <a:t>11/29/25</a:t>
             </a:fld>
             <a:endParaRPr lang="en-US"/>
           </a:p>
@@ -4969,7 +4969,7 @@
           <a:p>
             <a:fld id="{BAA8DE05-51EE-4692-B197-877FA1DAAAED}" type="datetimeFigureOut">
               <a:rPr lang="en-US" smtClean="0"/>
-              <a:t>8/14/25</a:t>
+              <a:t>11/29/25</a:t>
             </a:fld>
             <a:endParaRPr lang="en-US"/>
           </a:p>
@@ -5234,7 +5234,7 @@
           <a:p>
             <a:fld id="{BAA8DE05-51EE-4692-B197-877FA1DAAAED}" type="datetimeFigureOut">
               <a:rPr lang="en-US" smtClean="0"/>
-              <a:t>8/14/25</a:t>
+              <a:t>11/29/25</a:t>
             </a:fld>
             <a:endParaRPr lang="en-US"/>
           </a:p>
@@ -5646,7 +5646,7 @@
           <a:p>
             <a:fld id="{BAA8DE05-51EE-4692-B197-877FA1DAAAED}" type="datetimeFigureOut">
               <a:rPr lang="en-US" smtClean="0"/>
-              <a:t>8/14/25</a:t>
+              <a:t>11/29/25</a:t>
             </a:fld>
             <a:endParaRPr lang="en-US"/>
           </a:p>
@@ -5787,7 +5787,7 @@
           <a:p>
             <a:fld id="{BAA8DE05-51EE-4692-B197-877FA1DAAAED}" type="datetimeFigureOut">
               <a:rPr lang="en-US" smtClean="0"/>
-              <a:t>8/14/25</a:t>
+              <a:t>11/29/25</a:t>
             </a:fld>
             <a:endParaRPr lang="en-US"/>
           </a:p>
@@ -5900,7 +5900,7 @@
           <a:p>
             <a:fld id="{BAA8DE05-51EE-4692-B197-877FA1DAAAED}" type="datetimeFigureOut">
               <a:rPr lang="en-US" smtClean="0"/>
-              <a:t>8/14/25</a:t>
+              <a:t>11/29/25</a:t>
             </a:fld>
             <a:endParaRPr lang="en-US"/>
           </a:p>
@@ -6211,7 +6211,7 @@
           <a:p>
             <a:fld id="{BAA8DE05-51EE-4692-B197-877FA1DAAAED}" type="datetimeFigureOut">
               <a:rPr lang="en-US" smtClean="0"/>
-              <a:t>8/14/25</a:t>
+              <a:t>11/29/25</a:t>
             </a:fld>
             <a:endParaRPr lang="en-US"/>
           </a:p>
@@ -6499,7 +6499,7 @@
           <a:p>
             <a:fld id="{BAA8DE05-51EE-4692-B197-877FA1DAAAED}" type="datetimeFigureOut">
               <a:rPr lang="en-US" smtClean="0"/>
-              <a:t>8/14/25</a:t>
+              <a:t>11/29/25</a:t>
             </a:fld>
             <a:endParaRPr lang="en-US"/>
           </a:p>
@@ -6740,7 +6740,7 @@
           <a:p>
             <a:fld id="{BAA8DE05-51EE-4692-B197-877FA1DAAAED}" type="datetimeFigureOut">
               <a:rPr lang="en-US" smtClean="0"/>
-              <a:t>8/14/25</a:t>
+              <a:t>11/29/25</a:t>
             </a:fld>
             <a:endParaRPr lang="en-US"/>
           </a:p>
@@ -7543,8 +7543,8 @@
           </a:prstGeom>
         </p:spPr>
       </p:pic>
-      <mc:AlternateContent xmlns:mc="http://schemas.openxmlformats.org/markup-compatibility/2006">
-        <mc:Choice xmlns:p14="http://schemas.microsoft.com/office/powerpoint/2010/main" Requires="p14">
+      <mc:AlternateContent xmlns:mc="http://schemas.openxmlformats.org/markup-compatibility/2006" xmlns:p14="http://schemas.microsoft.com/office/powerpoint/2010/main">
+        <mc:Choice Requires="p14">
           <p:contentPart p14:bwMode="auto" r:id="rId5">
             <p14:nvContentPartPr>
               <p14:cNvPr id="15" name="Ink 14">
@@ -7563,7 +7563,7 @@
             </p14:xfrm>
           </p:contentPart>
         </mc:Choice>
-        <mc:Fallback>
+        <mc:Fallback xmlns="">
           <p:pic>
             <p:nvPicPr>
               <p:cNvPr id="15" name="Ink 14">
@@ -7594,8 +7594,8 @@
           </p:pic>
         </mc:Fallback>
       </mc:AlternateContent>
-      <mc:AlternateContent xmlns:mc="http://schemas.openxmlformats.org/markup-compatibility/2006">
-        <mc:Choice xmlns:p14="http://schemas.microsoft.com/office/powerpoint/2010/main" Requires="p14">
+      <mc:AlternateContent xmlns:mc="http://schemas.openxmlformats.org/markup-compatibility/2006" xmlns:p14="http://schemas.microsoft.com/office/powerpoint/2010/main">
+        <mc:Choice Requires="p14">
           <p:contentPart p14:bwMode="auto" r:id="rId7">
             <p14:nvContentPartPr>
               <p14:cNvPr id="16" name="Ink 15">
@@ -7614,7 +7614,7 @@
             </p14:xfrm>
           </p:contentPart>
         </mc:Choice>
-        <mc:Fallback>
+        <mc:Fallback xmlns="">
           <p:pic>
             <p:nvPicPr>
               <p:cNvPr id="16" name="Ink 15">
@@ -7645,8 +7645,8 @@
           </p:pic>
         </mc:Fallback>
       </mc:AlternateContent>
-      <mc:AlternateContent xmlns:mc="http://schemas.openxmlformats.org/markup-compatibility/2006">
-        <mc:Choice xmlns:p14="http://schemas.microsoft.com/office/powerpoint/2010/main" Requires="p14">
+      <mc:AlternateContent xmlns:mc="http://schemas.openxmlformats.org/markup-compatibility/2006" xmlns:p14="http://schemas.microsoft.com/office/powerpoint/2010/main">
+        <mc:Choice Requires="p14">
           <p:contentPart p14:bwMode="auto" r:id="rId9">
             <p14:nvContentPartPr>
               <p14:cNvPr id="17" name="Ink 16">
@@ -7665,7 +7665,7 @@
             </p14:xfrm>
           </p:contentPart>
         </mc:Choice>
-        <mc:Fallback>
+        <mc:Fallback xmlns="">
           <p:pic>
             <p:nvPicPr>
               <p:cNvPr id="17" name="Ink 16">
@@ -13187,6 +13187,15 @@
               <a:rPr lang="en-US" sz="1800">
                 <a:sym typeface="Wingdings" pitchFamily="2" charset="2"/>
               </a:rPr>
+              <a:t>- ... syntax and ... syntax can be ...</a:t>
+            </a:r>
+          </a:p>
+          <a:p>
+            <a:pPr algn="l"/>
+            <a:r>
+              <a:rPr lang="en-US" sz="1800">
+                <a:sym typeface="Wingdings" pitchFamily="2" charset="2"/>
+              </a:rPr>
               <a:t> </a:t>
             </a:r>
           </a:p>
@@ -13668,6 +13677,55 @@
                       </p:childTnLst>
                     </p:cTn>
                   </p:par>
+                  <p:par>
+                    <p:cTn id="23" fill="hold">
+                      <p:stCondLst>
+                        <p:cond delay="indefinite"/>
+                      </p:stCondLst>
+                      <p:childTnLst>
+                        <p:par>
+                          <p:cTn id="24" fill="hold">
+                            <p:stCondLst>
+                              <p:cond delay="0"/>
+                            </p:stCondLst>
+                            <p:childTnLst>
+                              <p:par>
+                                <p:cTn id="25" presetID="1" presetClass="entr" presetSubtype="0" fill="hold" nodeType="clickEffect">
+                                  <p:stCondLst>
+                                    <p:cond delay="0"/>
+                                  </p:stCondLst>
+                                  <p:childTnLst>
+                                    <p:set>
+                                      <p:cBhvr>
+                                        <p:cTn id="26" dur="1" fill="hold">
+                                          <p:stCondLst>
+                                            <p:cond delay="0"/>
+                                          </p:stCondLst>
+                                        </p:cTn>
+                                        <p:tgtEl>
+                                          <p:spTgt spid="4">
+                                            <p:txEl>
+                                              <p:pRg st="5" end="5"/>
+                                            </p:txEl>
+                                          </p:spTgt>
+                                        </p:tgtEl>
+                                        <p:attrNameLst>
+                                          <p:attrName>style.visibility</p:attrName>
+                                        </p:attrNameLst>
+                                      </p:cBhvr>
+                                      <p:to>
+                                        <p:strVal val="visible"/>
+                                      </p:to>
+                                    </p:set>
+                                  </p:childTnLst>
+                                </p:cTn>
+                              </p:par>
+                            </p:childTnLst>
+                          </p:cTn>
+                        </p:par>
+                      </p:childTnLst>
+                    </p:cTn>
+                  </p:par>
                 </p:childTnLst>
               </p:cTn>
               <p:prevCondLst>
@@ -14548,11 +14606,8 @@
               <a:rPr lang="en-US" sz="1800" dirty="0">
                 <a:sym typeface="Wingdings" pitchFamily="2" charset="2"/>
               </a:rPr>
-              <a:t>- There are some differences in ... However, Function still has ...</a:t>
+              <a:t>- ... are disappeared from ... interface ... except.. This is because</a:t>
             </a:r>
-            <a:endParaRPr lang="en-US" sz="1800" b="1" dirty="0">
-              <a:sym typeface="Wingdings" pitchFamily="2" charset="2"/>
-            </a:endParaRPr>
           </a:p>
           <a:p>
             <a:pPr algn="l"/>
@@ -15169,21 +15224,15 @@
               <a:rPr lang="en-US" sz="1800" dirty="0">
                 <a:sym typeface="Wingdings" pitchFamily="2" charset="2"/>
               </a:rPr>
-              <a:t>- These are all ... </a:t>
+              <a:t>- There are some differences in ... However, Function still has ...</a:t>
             </a:r>
+            <a:endParaRPr lang="en-US" sz="1800" b="1" dirty="0">
+              <a:sym typeface="Wingdings" pitchFamily="2" charset="2"/>
+            </a:endParaRPr>
           </a:p>
           <a:p>
             <a:pPr algn="l"/>
-            <a:r>
-              <a:rPr lang="en-US" sz="1800" dirty="0">
-                <a:sym typeface="Wingdings" pitchFamily="2" charset="2"/>
-              </a:rPr>
-              <a:t>- Why don’t we see ... in Function and BiFunction, it is because ...</a:t>
-            </a:r>
-          </a:p>
-          <a:p>
-            <a:pPr algn="l"/>
-            <a:endParaRPr lang="en-US" sz="1800" dirty="0">
+            <a:endParaRPr lang="en-US" sz="1800" b="1" dirty="0">
               <a:sym typeface="Wingdings" pitchFamily="2" charset="2"/>
             </a:endParaRPr>
           </a:p>
@@ -15193,7 +15242,7 @@
               <a:rPr lang="en-US" sz="1800" b="1" dirty="0">
                 <a:sym typeface="Wingdings" pitchFamily="2" charset="2"/>
               </a:rPr>
-              <a:t>Listin Parameters</a:t>
+              <a:t>Listing Parameters</a:t>
             </a:r>
           </a:p>
           <a:p>
@@ -16064,6 +16113,15 @@
                 <a:sym typeface="Wingdings" pitchFamily="2" charset="2"/>
               </a:rPr>
               <a:t>Referencing variables from the lambda body</a:t>
+            </a:r>
+          </a:p>
+          <a:p>
+            <a:pPr algn="l"/>
+            <a:r>
+              <a:rPr lang="en-US" sz="1800" dirty="0">
+                <a:sym typeface="Wingdings" pitchFamily="2" charset="2"/>
+              </a:rPr>
+              <a:t>- Lambda body can access .... All variables like ... and ... is ... but ... must be ...</a:t>
             </a:r>
           </a:p>
           <a:p>
@@ -20234,15 +20292,6 @@
               <a:rPr lang="en-US" sz="1800">
                 <a:sym typeface="Wingdings" pitchFamily="2" charset="2"/>
               </a:rPr>
-              <a:t>- Method reference doesn't require ... but with ... conditions, which are ... and ...</a:t>
-            </a:r>
-          </a:p>
-          <a:p>
-            <a:pPr algn="l"/>
-            <a:r>
-              <a:rPr lang="en-US" sz="1800">
-                <a:sym typeface="Wingdings" pitchFamily="2" charset="2"/>
-              </a:rPr>
               <a:t>(code illustration snippet 13)</a:t>
             </a:r>
           </a:p>
@@ -20283,24 +20332,6 @@
                 <a:sym typeface="Wingdings" pitchFamily="2" charset="2"/>
               </a:rPr>
               <a:t>- In this section, we will use ... with ... in ... interface ....</a:t>
-            </a:r>
-          </a:p>
-          <a:p>
-            <a:pPr algn="l"/>
-            <a:r>
-              <a:rPr lang="en-US" sz="1800">
-                <a:sym typeface="Wingdings" pitchFamily="2" charset="2"/>
-              </a:rPr>
-              <a:t>- The trick here is that we won't ...</a:t>
-            </a:r>
-          </a:p>
-          <a:p>
-            <a:pPr algn="l"/>
-            <a:r>
-              <a:rPr lang="en-US" sz="1800">
-                <a:sym typeface="Wingdings" pitchFamily="2" charset="2"/>
-              </a:rPr>
-              <a:t>- The only condition to ... is the ... must ... </a:t>
             </a:r>
           </a:p>
           <a:p>
@@ -20531,7 +20562,7 @@
                                         <p:tgtEl>
                                           <p:spTgt spid="4">
                                             <p:txEl>
-                                              <p:pRg st="4" end="4"/>
+                                              <p:pRg st="5" end="5"/>
                                             </p:txEl>
                                           </p:spTgt>
                                         </p:tgtEl>
@@ -20580,7 +20611,7 @@
                                         <p:tgtEl>
                                           <p:spTgt spid="4">
                                             <p:txEl>
-                                              <p:pRg st="6" end="6"/>
+                                              <p:pRg st="7" end="7"/>
                                             </p:txEl>
                                           </p:spTgt>
                                         </p:tgtEl>
@@ -20678,7 +20709,7 @@
                                         <p:tgtEl>
                                           <p:spTgt spid="4">
                                             <p:txEl>
-                                              <p:pRg st="9" end="9"/>
+                                              <p:pRg st="10" end="10"/>
                                             </p:txEl>
                                           </p:spTgt>
                                         </p:tgtEl>
@@ -20727,7 +20758,7 @@
                                         <p:tgtEl>
                                           <p:spTgt spid="4">
                                             <p:txEl>
-                                              <p:pRg st="10" end="10"/>
+                                              <p:pRg st="11" end="11"/>
                                             </p:txEl>
                                           </p:spTgt>
                                         </p:tgtEl>
@@ -20776,154 +20807,7 @@
                                         <p:tgtEl>
                                           <p:spTgt spid="4">
                                             <p:txEl>
-                                              <p:pRg st="11" end="11"/>
-                                            </p:txEl>
-                                          </p:spTgt>
-                                        </p:tgtEl>
-                                        <p:attrNameLst>
-                                          <p:attrName>style.visibility</p:attrName>
-                                        </p:attrNameLst>
-                                      </p:cBhvr>
-                                      <p:to>
-                                        <p:strVal val="visible"/>
-                                      </p:to>
-                                    </p:set>
-                                  </p:childTnLst>
-                                </p:cTn>
-                              </p:par>
-                            </p:childTnLst>
-                          </p:cTn>
-                        </p:par>
-                      </p:childTnLst>
-                    </p:cTn>
-                  </p:par>
-                  <p:par>
-                    <p:cTn id="39" fill="hold">
-                      <p:stCondLst>
-                        <p:cond delay="indefinite"/>
-                      </p:stCondLst>
-                      <p:childTnLst>
-                        <p:par>
-                          <p:cTn id="40" fill="hold">
-                            <p:stCondLst>
-                              <p:cond delay="0"/>
-                            </p:stCondLst>
-                            <p:childTnLst>
-                              <p:par>
-                                <p:cTn id="41" presetID="1" presetClass="entr" presetSubtype="0" fill="hold" nodeType="clickEffect">
-                                  <p:stCondLst>
-                                    <p:cond delay="0"/>
-                                  </p:stCondLst>
-                                  <p:childTnLst>
-                                    <p:set>
-                                      <p:cBhvr>
-                                        <p:cTn id="42" dur="1" fill="hold">
-                                          <p:stCondLst>
-                                            <p:cond delay="0"/>
-                                          </p:stCondLst>
-                                        </p:cTn>
-                                        <p:tgtEl>
-                                          <p:spTgt spid="4">
-                                            <p:txEl>
-                                              <p:pRg st="13" end="13"/>
-                                            </p:txEl>
-                                          </p:spTgt>
-                                        </p:tgtEl>
-                                        <p:attrNameLst>
-                                          <p:attrName>style.visibility</p:attrName>
-                                        </p:attrNameLst>
-                                      </p:cBhvr>
-                                      <p:to>
-                                        <p:strVal val="visible"/>
-                                      </p:to>
-                                    </p:set>
-                                  </p:childTnLst>
-                                </p:cTn>
-                              </p:par>
-                            </p:childTnLst>
-                          </p:cTn>
-                        </p:par>
-                      </p:childTnLst>
-                    </p:cTn>
-                  </p:par>
-                  <p:par>
-                    <p:cTn id="43" fill="hold">
-                      <p:stCondLst>
-                        <p:cond delay="indefinite"/>
-                      </p:stCondLst>
-                      <p:childTnLst>
-                        <p:par>
-                          <p:cTn id="44" fill="hold">
-                            <p:stCondLst>
-                              <p:cond delay="0"/>
-                            </p:stCondLst>
-                            <p:childTnLst>
-                              <p:par>
-                                <p:cTn id="45" presetID="1" presetClass="entr" presetSubtype="0" fill="hold" nodeType="clickEffect">
-                                  <p:stCondLst>
-                                    <p:cond delay="0"/>
-                                  </p:stCondLst>
-                                  <p:childTnLst>
-                                    <p:set>
-                                      <p:cBhvr>
-                                        <p:cTn id="46" dur="1" fill="hold">
-                                          <p:stCondLst>
-                                            <p:cond delay="0"/>
-                                          </p:stCondLst>
-                                        </p:cTn>
-                                        <p:tgtEl>
-                                          <p:spTgt spid="4">
-                                            <p:txEl>
-                                              <p:pRg st="14" end="14"/>
-                                            </p:txEl>
-                                          </p:spTgt>
-                                        </p:tgtEl>
-                                        <p:attrNameLst>
-                                          <p:attrName>style.visibility</p:attrName>
-                                        </p:attrNameLst>
-                                      </p:cBhvr>
-                                      <p:to>
-                                        <p:strVal val="visible"/>
-                                      </p:to>
-                                    </p:set>
-                                  </p:childTnLst>
-                                </p:cTn>
-                              </p:par>
-                            </p:childTnLst>
-                          </p:cTn>
-                        </p:par>
-                      </p:childTnLst>
-                    </p:cTn>
-                  </p:par>
-                  <p:par>
-                    <p:cTn id="47" fill="hold">
-                      <p:stCondLst>
-                        <p:cond delay="indefinite"/>
-                      </p:stCondLst>
-                      <p:childTnLst>
-                        <p:par>
-                          <p:cTn id="48" fill="hold">
-                            <p:stCondLst>
-                              <p:cond delay="0"/>
-                            </p:stCondLst>
-                            <p:childTnLst>
-                              <p:par>
-                                <p:cTn id="49" presetID="1" presetClass="entr" presetSubtype="0" fill="hold" nodeType="clickEffect">
-                                  <p:stCondLst>
-                                    <p:cond delay="0"/>
-                                  </p:stCondLst>
-                                  <p:childTnLst>
-                                    <p:set>
-                                      <p:cBhvr>
-                                        <p:cTn id="50" dur="1" fill="hold">
-                                          <p:stCondLst>
-                                            <p:cond delay="0"/>
-                                          </p:stCondLst>
-                                        </p:cTn>
-                                        <p:tgtEl>
-                                          <p:spTgt spid="4">
-                                            <p:txEl>
-                                              <p:pRg st="15" end="15"/>
+                                              <p:pRg st="12" end="12"/>
                                             </p:txEl>
                                           </p:spTgt>
                                         </p:tgtEl>

</xml_diff>